<commit_message>
Fixing typos - thank you Oren
</commit_message>
<xml_diff>
--- a/LEXICAL CAPTCHA BEAT-DOWN.pptx
+++ b/LEXICAL CAPTCHA BEAT-DOWN.pptx
@@ -3684,12 +3684,12 @@
               <a:t>Distribution and </a:t>
             </a:r>
             <a:r>
-              <a:rPr lang="en-US" sz="1400" b="1" dirty="0" err="1" smtClean="0"/>
-              <a:t>deriviation</a:t>
-            </a:r>
-            <a:r>
               <a:rPr lang="en-US" sz="1400" b="1" dirty="0" smtClean="0"/>
-              <a:t> is allowed under the GNU </a:t>
+              <a:t>derivation is </a:t>
+            </a:r>
+            <a:r>
+              <a:rPr lang="en-US" sz="1400" b="1" dirty="0" smtClean="0"/>
+              <a:t>allowed under the GNU </a:t>
             </a:r>
             <a:r>
               <a:rPr lang="en-US" sz="1400" b="1" dirty="0"/>
@@ -4740,8 +4740,8 @@
           <a:p>
             <a:pPr algn="ctr"/>
             <a:r>
-              <a:rPr lang="en-US" dirty="0" err="1" smtClean="0"/>
-              <a:t>Efficiancy</a:t>
+              <a:rPr lang="en-US" smtClean="0"/>
+              <a:t>Efficiency</a:t>
             </a:r>
             <a:endParaRPr lang="en-US" dirty="0"/>
           </a:p>
@@ -4764,7 +4764,15 @@
           <a:p>
             <a:r>
               <a:rPr lang="en-US" dirty="0" smtClean="0"/>
-              <a:t>In Lab is different then real world</a:t>
+              <a:t>In Lab is different </a:t>
+            </a:r>
+            <a:r>
+              <a:rPr lang="en-US" dirty="0" smtClean="0"/>
+              <a:t>than </a:t>
+            </a:r>
+            <a:r>
+              <a:rPr lang="en-US" dirty="0" smtClean="0"/>
+              <a:t>real world</a:t>
             </a:r>
           </a:p>
           <a:p>

</xml_diff>